<commit_message>
Why do we sleep?
</commit_message>
<xml_diff>
--- a/Warp_drive/News.pptx
+++ b/Warp_drive/News.pptx
@@ -112,7 +112,7 @@
   </p:defaultTextStyle>
   <p:extLst>
     <p:ext uri="{EFAFB233-063F-42B5-8137-9DF3F51BA10A}">
-      <p15:sldGuideLst xmlns:p15="http://schemas.microsoft.com/office/powerpoint/2012/main" xmlns="">
+      <p15:sldGuideLst xmlns:p15="http://schemas.microsoft.com/office/powerpoint/2012/main">
         <p15:guide id="1" orient="horz" pos="2160">
           <p15:clr>
             <a:srgbClr val="A4A3A4"/>
@@ -851,7 +851,7 @@
           <a:p>
             <a:fld id="{252F7152-2E34-4CF8-96E1-9C0B6BE1AFF1}" type="datetimeFigureOut">
               <a:rPr lang="ru-RU" smtClean="0"/>
-              <a:t>14.05.2015</a:t>
+              <a:t>18.05.2015</a:t>
             </a:fld>
             <a:endParaRPr lang="ru-RU"/>
           </a:p>
@@ -1102,7 +1102,7 @@
           <a:p>
             <a:fld id="{252F7152-2E34-4CF8-96E1-9C0B6BE1AFF1}" type="datetimeFigureOut">
               <a:rPr lang="ru-RU" smtClean="0"/>
-              <a:t>14.05.2015</a:t>
+              <a:t>18.05.2015</a:t>
             </a:fld>
             <a:endParaRPr lang="ru-RU"/>
           </a:p>
@@ -1416,7 +1416,7 @@
           <a:p>
             <a:fld id="{252F7152-2E34-4CF8-96E1-9C0B6BE1AFF1}" type="datetimeFigureOut">
               <a:rPr lang="ru-RU" smtClean="0"/>
-              <a:t>14.05.2015</a:t>
+              <a:t>18.05.2015</a:t>
             </a:fld>
             <a:endParaRPr lang="ru-RU"/>
           </a:p>
@@ -1757,7 +1757,7 @@
           <a:p>
             <a:fld id="{252F7152-2E34-4CF8-96E1-9C0B6BE1AFF1}" type="datetimeFigureOut">
               <a:rPr lang="ru-RU" smtClean="0"/>
-              <a:t>14.05.2015</a:t>
+              <a:t>18.05.2015</a:t>
             </a:fld>
             <a:endParaRPr lang="ru-RU"/>
           </a:p>
@@ -2071,7 +2071,7 @@
           <a:p>
             <a:fld id="{252F7152-2E34-4CF8-96E1-9C0B6BE1AFF1}" type="datetimeFigureOut">
               <a:rPr lang="ru-RU" smtClean="0"/>
-              <a:t>14.05.2015</a:t>
+              <a:t>18.05.2015</a:t>
             </a:fld>
             <a:endParaRPr lang="ru-RU"/>
           </a:p>
@@ -2464,7 +2464,7 @@
           <a:p>
             <a:fld id="{252F7152-2E34-4CF8-96E1-9C0B6BE1AFF1}" type="datetimeFigureOut">
               <a:rPr lang="ru-RU" smtClean="0"/>
-              <a:t>14.05.2015</a:t>
+              <a:t>18.05.2015</a:t>
             </a:fld>
             <a:endParaRPr lang="ru-RU"/>
           </a:p>
@@ -2634,7 +2634,7 @@
           <a:p>
             <a:fld id="{252F7152-2E34-4CF8-96E1-9C0B6BE1AFF1}" type="datetimeFigureOut">
               <a:rPr lang="ru-RU" smtClean="0"/>
-              <a:t>14.05.2015</a:t>
+              <a:t>18.05.2015</a:t>
             </a:fld>
             <a:endParaRPr lang="ru-RU"/>
           </a:p>
@@ -2814,7 +2814,7 @@
           <a:p>
             <a:fld id="{252F7152-2E34-4CF8-96E1-9C0B6BE1AFF1}" type="datetimeFigureOut">
               <a:rPr lang="ru-RU" smtClean="0"/>
-              <a:t>14.05.2015</a:t>
+              <a:t>18.05.2015</a:t>
             </a:fld>
             <a:endParaRPr lang="ru-RU"/>
           </a:p>
@@ -2990,7 +2990,7 @@
           <a:p>
             <a:fld id="{252F7152-2E34-4CF8-96E1-9C0B6BE1AFF1}" type="datetimeFigureOut">
               <a:rPr lang="ru-RU" smtClean="0"/>
-              <a:t>14.05.2015</a:t>
+              <a:t>18.05.2015</a:t>
             </a:fld>
             <a:endParaRPr lang="ru-RU"/>
           </a:p>
@@ -3237,7 +3237,7 @@
           <a:p>
             <a:fld id="{252F7152-2E34-4CF8-96E1-9C0B6BE1AFF1}" type="datetimeFigureOut">
               <a:rPr lang="ru-RU" smtClean="0"/>
-              <a:t>14.05.2015</a:t>
+              <a:t>18.05.2015</a:t>
             </a:fld>
             <a:endParaRPr lang="ru-RU"/>
           </a:p>
@@ -3469,7 +3469,7 @@
           <a:p>
             <a:fld id="{252F7152-2E34-4CF8-96E1-9C0B6BE1AFF1}" type="datetimeFigureOut">
               <a:rPr lang="ru-RU" smtClean="0"/>
-              <a:t>14.05.2015</a:t>
+              <a:t>18.05.2015</a:t>
             </a:fld>
             <a:endParaRPr lang="ru-RU"/>
           </a:p>
@@ -3843,7 +3843,7 @@
           <a:p>
             <a:fld id="{252F7152-2E34-4CF8-96E1-9C0B6BE1AFF1}" type="datetimeFigureOut">
               <a:rPr lang="ru-RU" smtClean="0"/>
-              <a:t>14.05.2015</a:t>
+              <a:t>18.05.2015</a:t>
             </a:fld>
             <a:endParaRPr lang="ru-RU"/>
           </a:p>
@@ -3966,7 +3966,7 @@
           <a:p>
             <a:fld id="{252F7152-2E34-4CF8-96E1-9C0B6BE1AFF1}" type="datetimeFigureOut">
               <a:rPr lang="ru-RU" smtClean="0"/>
-              <a:t>14.05.2015</a:t>
+              <a:t>18.05.2015</a:t>
             </a:fld>
             <a:endParaRPr lang="ru-RU"/>
           </a:p>
@@ -4061,7 +4061,7 @@
           <a:p>
             <a:fld id="{252F7152-2E34-4CF8-96E1-9C0B6BE1AFF1}" type="datetimeFigureOut">
               <a:rPr lang="ru-RU" smtClean="0"/>
-              <a:t>14.05.2015</a:t>
+              <a:t>18.05.2015</a:t>
             </a:fld>
             <a:endParaRPr lang="ru-RU"/>
           </a:p>
@@ -4316,7 +4316,7 @@
           <a:p>
             <a:fld id="{252F7152-2E34-4CF8-96E1-9C0B6BE1AFF1}" type="datetimeFigureOut">
               <a:rPr lang="ru-RU" smtClean="0"/>
-              <a:t>14.05.2015</a:t>
+              <a:t>18.05.2015</a:t>
             </a:fld>
             <a:endParaRPr lang="ru-RU"/>
           </a:p>
@@ -4579,7 +4579,7 @@
           <a:p>
             <a:fld id="{252F7152-2E34-4CF8-96E1-9C0B6BE1AFF1}" type="datetimeFigureOut">
               <a:rPr lang="ru-RU" smtClean="0"/>
-              <a:t>14.05.2015</a:t>
+              <a:t>18.05.2015</a:t>
             </a:fld>
             <a:endParaRPr lang="ru-RU"/>
           </a:p>
@@ -5322,7 +5322,7 @@
           <a:p>
             <a:fld id="{252F7152-2E34-4CF8-96E1-9C0B6BE1AFF1}" type="datetimeFigureOut">
               <a:rPr lang="ru-RU" smtClean="0"/>
-              <a:t>14.05.2015</a:t>
+              <a:t>18.05.2015</a:t>
             </a:fld>
             <a:endParaRPr lang="ru-RU"/>
           </a:p>
@@ -6729,7 +6729,6 @@
               <a:rPr lang="en-US" dirty="0"/>
               <a:t>“Warp Drive” or any other term for faster-than-light travel still remains at the level of speculation and for the near future, warp drive remains a dream</a:t>
             </a:r>
-            <a:endParaRPr lang="en-US" dirty="0"/>
           </a:p>
         </p:txBody>
       </p:sp>
@@ -7070,7 +7069,7 @@
   <a:extraClrSchemeLst/>
   <a:extLst>
     <a:ext uri="{05A4C25C-085E-4340-85A3-A5531E510DB2}">
-      <thm15:themeFamily xmlns:thm15="http://schemas.microsoft.com/office/thememl/2012/main" xmlns="" name="Facet" id="{C0C680CD-088A-49FC-A102-D699147F32B2}" vid="{CFBC31BA-B70F-4F30-BCAA-4F3011E16C4D}"/>
+      <thm15:themeFamily xmlns:thm15="http://schemas.microsoft.com/office/thememl/2012/main" name="Facet" id="{C0C680CD-088A-49FC-A102-D699147F32B2}" vid="{CFBC31BA-B70F-4F30-BCAA-4F3011E16C4D}"/>
     </a:ext>
   </a:extLst>
 </a:theme>

</xml_diff>